<commit_message>
Add comments to 09-Lifecycle-of-Information-System.pptx
</commit_message>
<xml_diff>
--- a/Courses/Software-Sciences/Module-4-Information-Systems-New/09-Lifecycle-of-Information-System/09-Lifecycle-of-Information-System.pptx
+++ b/Courses/Software-Sciences/Module-4-Information-Systems-New/09-Lifecycle-of-Information-System/09-Lifecycle-of-Information-System.pptx
@@ -227,7 +227,7 @@
 
 <file path=ppt/commentAuthors.xml><?xml version="1.0" encoding="utf-8"?>
 <p:cmAuthorLst xmlns:a="http://schemas.openxmlformats.org/drawingml/2006/main" xmlns:r="http://schemas.openxmlformats.org/officeDocument/2006/relationships" xmlns:p="http://schemas.openxmlformats.org/presentationml/2006/main">
-  <p:cmAuthor id="1" name="Mirela Damyanova" initials="MD" lastIdx="9" clrIdx="0">
+  <p:cmAuthor id="1" name="Mirela Damyanova" initials="MD" lastIdx="16" clrIdx="0">
     <p:extLst>
       <p:ext uri="{19B8F6BF-5375-455C-9EA6-DF929625EA0E}">
         <p15:presenceInfo xmlns:p15="http://schemas.microsoft.com/office/powerpoint/2012/main" userId="Mirela Damyanova" providerId="None"/>
@@ -255,6 +255,17 @@
       </p:ext>
     </p:extLst>
   </p:cm>
+  <p:cm authorId="1" dt="2024-10-13T10:09:13.896" idx="11">
+    <p:pos x="10" y="123"/>
+    <p:text>Това се прави в 11.Упражнение: Дизайн на база данни. Идеята тук е да се проектира дизайн на база данни - да се опише писмено в текст какво ще има бд</p:text>
+    <p:extLst>
+      <p:ext uri="{C676402C-5697-4E1C-873F-D02D1690AC5C}">
+        <p15:threadingInfo xmlns:p15="http://schemas.microsoft.com/office/powerpoint/2012/main" timeZoneBias="-180">
+          <p15:parentCm authorId="2" idx="1"/>
+        </p15:threadingInfo>
+      </p:ext>
+    </p:extLst>
+  </p:cm>
 </p:cmLst>
 </file>
 
@@ -266,6 +277,17 @@
     <p:extLst>
       <p:ext uri="{C676402C-5697-4E1C-873F-D02D1690AC5C}">
         <p15:threadingInfo xmlns:p15="http://schemas.microsoft.com/office/powerpoint/2012/main" timeZoneBias="-180"/>
+      </p:ext>
+    </p:extLst>
+  </p:cm>
+  <p:cm authorId="1" dt="2024-10-13T10:09:57.151" idx="13">
+    <p:pos x="10" y="236"/>
+    <p:text>Това се прави в 11.Упражнение: Дизайн на база данни. Идеята тук е да се проектира дизайн на база данни - да се опише писмено в текст какво ще има бд</p:text>
+    <p:extLst>
+      <p:ext uri="{C676402C-5697-4E1C-873F-D02D1690AC5C}">
+        <p15:threadingInfo xmlns:p15="http://schemas.microsoft.com/office/powerpoint/2012/main" timeZoneBias="-180">
+          <p15:parentCm authorId="2" idx="2"/>
+        </p15:threadingInfo>
       </p:ext>
     </p:extLst>
   </p:cm>
@@ -283,6 +305,17 @@
       </p:ext>
     </p:extLst>
   </p:cm>
+  <p:cm authorId="1" dt="2024-10-13T10:07:31.894" idx="10">
+    <p:pos x="7630" y="1706"/>
+    <p:text>Ако се промени да е по-голяма ще направим компромис с логичната подредба на таблиците. Според мен така е по-ясно структурирано...</p:text>
+    <p:extLst>
+      <p:ext uri="{C676402C-5697-4E1C-873F-D02D1690AC5C}">
+        <p15:threadingInfo xmlns:p15="http://schemas.microsoft.com/office/powerpoint/2012/main" timeZoneBias="-180">
+          <p15:parentCm authorId="2" idx="3"/>
+        </p15:threadingInfo>
+      </p:ext>
+    </p:extLst>
+  </p:cm>
 </p:cmLst>
 </file>
 
@@ -294,6 +327,17 @@
     <p:extLst>
       <p:ext uri="{C676402C-5697-4E1C-873F-D02D1690AC5C}">
         <p15:threadingInfo xmlns:p15="http://schemas.microsoft.com/office/powerpoint/2012/main" timeZoneBias="-180"/>
+      </p:ext>
+    </p:extLst>
+  </p:cm>
+  <p:cm authorId="1" dt="2024-10-13T10:12:04.519" idx="16">
+    <p:pos x="10" y="349"/>
+    <p:text>Това се прави в 10.Упражнение: Анализ на изискванията и проектиране на UI. Идеята тук е да се проектира дизайн на UI - да се опише писмено в текст кои ще са формите и какво ще съдържат. Ако се добави една от формите, не трябва ли да се добавят всички? Няма ли да стане, че показваме нещо предварително, когато то трябва да се направи в следващия урок?</p:text>
+    <p:extLst>
+      <p:ext uri="{C676402C-5697-4E1C-873F-D02D1690AC5C}">
+        <p15:threadingInfo xmlns:p15="http://schemas.microsoft.com/office/powerpoint/2012/main" timeZoneBias="-180">
+          <p15:parentCm authorId="2" idx="5"/>
+        </p15:threadingInfo>
       </p:ext>
     </p:extLst>
   </p:cm>
@@ -394,7 +438,7 @@
           <a:p>
             <a:fld id="{4E087215-0C8F-4762-A664-737A353EC9A4}" type="datetimeFigureOut">
               <a:rPr lang="bg-BG" smtClean="0"/>
-              <a:t>12.10.2024 г.</a:t>
+              <a:t>13.10.24 г.</a:t>
             </a:fld>
             <a:endParaRPr lang="bg-BG"/>
           </a:p>
@@ -590,7 +634,7 @@
           <a:p>
             <a:fld id="{72D84649-876A-46C9-8472-14CB09C070D8}" type="datetimeFigureOut">
               <a:rPr lang="en-US" smtClean="0"/>
-              <a:t>10/12/2024</a:t>
+              <a:t>10/13/24</a:t>
             </a:fld>
             <a:endParaRPr lang="en-US"/>
           </a:p>
@@ -8853,13 +8897,6 @@
       <p:transition spd="slow" advClick="0" advTm="5000"/>
     </mc:Fallback>
   </mc:AlternateContent>
-  <p:timing>
-    <p:tnLst>
-      <p:par>
-        <p:cTn id="1" dur="indefinite" restart="never" nodeType="tmRoot"/>
-      </p:par>
-    </p:tnLst>
-  </p:timing>
 </p:sld>
 </file>
 
@@ -9004,13 +9041,6 @@
       <p:transition spd="slow" advClick="0" advTm="5000"/>
     </mc:Fallback>
   </mc:AlternateContent>
-  <p:timing>
-    <p:tnLst>
-      <p:par>
-        <p:cTn id="1" dur="indefinite" restart="never" nodeType="tmRoot"/>
-      </p:par>
-    </p:tnLst>
-  </p:timing>
 </p:sld>
 </file>
 
@@ -9585,13 +9615,6 @@
       <p:transition spd="slow" advClick="0" advTm="5000"/>
     </mc:Fallback>
   </mc:AlternateContent>
-  <p:timing>
-    <p:tnLst>
-      <p:par>
-        <p:cTn id="1" dur="indefinite" restart="never" nodeType="tmRoot"/>
-      </p:par>
-    </p:tnLst>
-  </p:timing>
 </p:sld>
 </file>
 
@@ -11747,13 +11770,6 @@
       <p:transition spd="slow" advClick="0" advTm="5000"/>
     </mc:Fallback>
   </mc:AlternateContent>
-  <p:timing>
-    <p:tnLst>
-      <p:par>
-        <p:cTn id="1" dur="indefinite" restart="never" nodeType="tmRoot"/>
-      </p:par>
-    </p:tnLst>
-  </p:timing>
 </p:sld>
 </file>
 
@@ -12954,7 +12970,7 @@
                     <a:p>
                       <a:pPr algn="ctr"/>
                       <a:r>
-                        <a:rPr lang="bg-BG" sz="1800" dirty="0" smtClean="0">
+                        <a:rPr lang="bg-BG" sz="1800" dirty="0">
                           <a:solidFill>
                             <a:schemeClr val="bg2"/>
                           </a:solidFill>
@@ -13022,7 +13038,7 @@
                     <a:p>
                       <a:pPr algn="ctr"/>
                       <a:r>
-                        <a:rPr lang="bg-BG" sz="1800" dirty="0" smtClean="0">
+                        <a:rPr lang="bg-BG" sz="1800" dirty="0">
                           <a:solidFill>
                             <a:schemeClr val="bg2"/>
                           </a:solidFill>
@@ -13090,7 +13106,7 @@
                     <a:p>
                       <a:pPr algn="ctr"/>
                       <a:r>
-                        <a:rPr lang="bg-BG" sz="1800" dirty="0" smtClean="0">
+                        <a:rPr lang="bg-BG" sz="1800" dirty="0">
                           <a:solidFill>
                             <a:schemeClr val="bg2"/>
                           </a:solidFill>
@@ -13165,7 +13181,7 @@
                     <a:p>
                       <a:pPr algn="ctr"/>
                       <a:r>
-                        <a:rPr lang="en-US" dirty="0" err="1" smtClean="0">
+                        <a:rPr lang="en-US" dirty="0" err="1">
                           <a:solidFill>
                             <a:schemeClr val="bg2"/>
                           </a:solidFill>
@@ -13233,18 +13249,13 @@
                     <a:p>
                       <a:pPr algn="ctr"/>
                       <a:r>
-                        <a:rPr lang="en-US" dirty="0" smtClean="0">
+                        <a:rPr lang="en-US" dirty="0">
                           <a:solidFill>
                             <a:schemeClr val="bg2"/>
                           </a:solidFill>
                         </a:rPr>
                         <a:t>parola123</a:t>
                       </a:r>
-                      <a:endParaRPr lang="en-US" dirty="0">
-                        <a:solidFill>
-                          <a:schemeClr val="bg2"/>
-                        </a:solidFill>
-                      </a:endParaRPr>
                     </a:p>
                   </a:txBody>
                   <a:tcPr anchor="ctr">
@@ -13301,18 +13312,13 @@
                     <a:p>
                       <a:pPr algn="ctr"/>
                       <a:r>
-                        <a:rPr lang="en-US" dirty="0" smtClean="0">
+                        <a:rPr lang="en-US" dirty="0">
                           <a:solidFill>
                             <a:schemeClr val="bg2"/>
                           </a:solidFill>
                         </a:rPr>
                         <a:t>Admin</a:t>
                       </a:r>
-                      <a:endParaRPr lang="en-US" dirty="0">
-                        <a:solidFill>
-                          <a:schemeClr val="bg2"/>
-                        </a:solidFill>
-                      </a:endParaRPr>
                     </a:p>
                   </a:txBody>
                   <a:tcPr anchor="ctr">
@@ -15112,13 +15118,6 @@
       <p:transition spd="slow" advClick="0" advTm="5000"/>
     </mc:Fallback>
   </mc:AlternateContent>
-  <p:timing>
-    <p:tnLst>
-      <p:par>
-        <p:cTn id="1" dur="indefinite" restart="never" nodeType="tmRoot"/>
-      </p:par>
-    </p:tnLst>
-  </p:timing>
 </p:sld>
 </file>
 
@@ -15269,13 +15268,6 @@
       <p:transition spd="slow" advClick="0" advTm="5000"/>
     </mc:Fallback>
   </mc:AlternateContent>
-  <p:timing>
-    <p:tnLst>
-      <p:par>
-        <p:cTn id="1" dur="indefinite" restart="never" nodeType="tmRoot"/>
-      </p:par>
-    </p:tnLst>
-  </p:timing>
 </p:sld>
 </file>
 
@@ -21689,13 +21681,6 @@
       <p:transition spd="slow" advClick="0" advTm="5000"/>
     </mc:Fallback>
   </mc:AlternateContent>
-  <p:timing>
-    <p:tnLst>
-      <p:par>
-        <p:cTn id="1" dur="indefinite" restart="never" nodeType="tmRoot"/>
-      </p:par>
-    </p:tnLst>
-  </p:timing>
 </p:sld>
 </file>
 
@@ -23810,7 +23795,7 @@
                 <a:hlinkClick r:id="rId3">
                   <a:extLst>
                     <a:ext uri="{A12FA001-AC4F-418D-AE19-62706E023703}">
-                      <ahyp:hlinkClr xmlns="" xmlns:ahyp="http://schemas.microsoft.com/office/drawing/2018/hyperlinkcolor" val="tx"/>
+                      <ahyp:hlinkClr xmlns:ahyp="http://schemas.microsoft.com/office/drawing/2018/hyperlinkcolor" val="tx"/>
                     </a:ext>
                   </a:extLst>
                 </a:hlinkClick>
@@ -23883,13 +23868,6 @@
       <p:transition spd="slow" advClick="0" advTm="5000"/>
     </mc:Fallback>
   </mc:AlternateContent>
-  <p:timing>
-    <p:tnLst>
-      <p:par>
-        <p:cTn id="1" dur="indefinite" restart="never" nodeType="tmRoot"/>
-      </p:par>
-    </p:tnLst>
-  </p:timing>
 </p:sld>
 </file>
 
@@ -24707,10 +24685,6 @@
             <a:r>
               <a:rPr lang="bg-BG" sz="3200" dirty="0"/>
               <a:t>Събираме и анализираме</a:t>
-            </a:r>
-            <a:r>
-              <a:rPr lang="en-US" sz="3200" dirty="0"/>
-              <a:t/>
             </a:r>
             <a:br>
               <a:rPr lang="en-US" sz="3200" dirty="0"/>

</xml_diff>